<commit_message>
Added a few things to the poster to test out manipulation
</commit_message>
<xml_diff>
--- a/Design Poster.pptx
+++ b/Design Poster.pptx
@@ -10,15 +10,19 @@
   <p:sldIdLst>
     <p:sldId id="256" r:id="rId2"/>
   </p:sldIdLst>
-  <p:sldSz cx="38404800" cy="43891200"/>
+  <p:sldSz cx="32918400" cy="43891200"/>
   <p:notesSz cx="6858000" cy="9144000"/>
   <p:embeddedFontLst>
     <p:embeddedFont>
+      <p:font typeface="Cambria Math" panose="02040503050406030204" pitchFamily="18" charset="0"/>
+      <p:regular r:id="rId4"/>
+    </p:embeddedFont>
+    <p:embeddedFont>
       <p:font typeface="Roboto" panose="020B0604020202020204" charset="0"/>
-      <p:regular r:id="rId4"/>
-      <p:bold r:id="rId5"/>
-      <p:italic r:id="rId6"/>
-      <p:boldItalic r:id="rId7"/>
+      <p:regular r:id="rId5"/>
+      <p:bold r:id="rId6"/>
+      <p:italic r:id="rId7"/>
+      <p:boldItalic r:id="rId8"/>
     </p:embeddedFont>
   </p:embeddedFontLst>
   <p:defaultTextStyle>
@@ -232,6 +236,11 @@
       </a:defRPr>
     </a:lvl9pPr>
   </p:defaultTextStyle>
+  <p:extLst>
+    <p:ext uri="{EFAFB233-063F-42B5-8137-9DF3F51BA10A}">
+      <p15:sldGuideLst xmlns:p15="http://schemas.microsoft.com/office/powerpoint/2012/main"/>
+    </p:ext>
+  </p:extLst>
 </p:presentation>
 </file>
 
@@ -239,15 +248,6 @@
 <p:cmAuthorLst xmlns:a="http://schemas.openxmlformats.org/drawingml/2006/main" xmlns:r="http://schemas.openxmlformats.org/officeDocument/2006/relationships" xmlns:p="http://schemas.openxmlformats.org/presentationml/2006/main">
   <p:cmAuthor id="0" name="Nicolette Lippert" initials="" lastIdx="1" clrIdx="0"/>
 </p:cmAuthorLst>
-</file>
-
-<file path=ppt/comments/comment1.xml><?xml version="1.0" encoding="utf-8"?>
-<p:cmLst xmlns:a="http://schemas.openxmlformats.org/drawingml/2006/main" xmlns:r="http://schemas.openxmlformats.org/officeDocument/2006/relationships" xmlns:p="http://schemas.openxmlformats.org/presentationml/2006/main">
-  <p:cm authorId="0" dt="2015-11-21T14:18:03.263" idx="1">
-    <p:pos x="6000" y="0"/>
-    <p:text>Currently sized at 42x48 in. i don't know how big it needs to be.</p:text>
-  </p:cm>
-</p:cmLst>
 </file>
 
 <file path=ppt/notesMasters/notesMaster1.xml><?xml version="1.0" encoding="utf-8"?>
@@ -284,8 +284,8 @@
         </p:nvSpPr>
         <p:spPr>
           <a:xfrm>
-            <a:off x="1929131" y="685800"/>
-            <a:ext cx="3000300" cy="3429000"/>
+            <a:off x="2143125" y="685800"/>
+            <a:ext cx="2571750" cy="3429000"/>
           </a:xfrm>
           <a:custGeom>
             <a:avLst/>
@@ -536,8 +536,8 @@
         </p:nvSpPr>
         <p:spPr>
           <a:xfrm>
-            <a:off x="1928813" y="685800"/>
-            <a:ext cx="3000375" cy="3429000"/>
+            <a:off x="2143125" y="685800"/>
+            <a:ext cx="2571750" cy="3429000"/>
           </a:xfrm>
           <a:custGeom>
             <a:avLst/>
@@ -651,8 +651,8 @@
         </p:nvGrpSpPr>
         <p:grpSpPr>
           <a:xfrm>
-            <a:off x="25613186" y="41"/>
-            <a:ext cx="12791624" cy="17327466"/>
+            <a:off x="21954160" y="41"/>
+            <a:ext cx="10964249" cy="17327466"/>
             <a:chOff x="6098378" y="4"/>
             <a:chExt cx="3045625" cy="2030570"/>
           </a:xfrm>
@@ -690,7 +690,7 @@
                 </a:spcBef>
                 <a:buNone/>
               </a:pPr>
-              <a:endParaRPr/>
+              <a:endParaRPr sz="1200"/>
             </a:p>
           </p:txBody>
         </p:sp>
@@ -727,7 +727,7 @@
                 </a:spcBef>
                 <a:buNone/>
               </a:pPr>
-              <a:endParaRPr/>
+              <a:endParaRPr sz="1200"/>
             </a:p>
           </p:txBody>
         </p:sp>
@@ -764,7 +764,7 @@
                 </a:spcBef>
                 <a:buNone/>
               </a:pPr>
-              <a:endParaRPr/>
+              <a:endParaRPr sz="1200"/>
             </a:p>
           </p:txBody>
         </p:sp>
@@ -801,7 +801,7 @@
                 </a:spcBef>
                 <a:buNone/>
               </a:pPr>
-              <a:endParaRPr/>
+              <a:endParaRPr sz="1200"/>
             </a:p>
           </p:txBody>
         </p:sp>
@@ -838,7 +838,7 @@
                 </a:spcBef>
                 <a:buNone/>
               </a:pPr>
-              <a:endParaRPr/>
+              <a:endParaRPr sz="1200"/>
             </a:p>
           </p:txBody>
         </p:sp>
@@ -855,8 +855,8 @@
         </p:nvSpPr>
         <p:spPr>
           <a:xfrm>
-            <a:off x="2512019" y="15148564"/>
-            <a:ext cx="34532698" cy="7157700"/>
+            <a:off x="2153159" y="15148564"/>
+            <a:ext cx="29599455" cy="7157700"/>
           </a:xfrm>
           <a:prstGeom prst="rect">
             <a:avLst/>
@@ -873,7 +873,7 @@
                 <a:schemeClr val="lt1"/>
               </a:buClr>
               <a:buSzPct val="100000"/>
-              <a:defRPr sz="23700">
+              <a:defRPr sz="20313">
                 <a:solidFill>
                   <a:schemeClr val="lt1"/>
                 </a:solidFill>
@@ -887,7 +887,7 @@
                 <a:schemeClr val="lt1"/>
               </a:buClr>
               <a:buSzPct val="100000"/>
-              <a:defRPr sz="23700">
+              <a:defRPr sz="20313">
                 <a:solidFill>
                   <a:schemeClr val="lt1"/>
                 </a:solidFill>
@@ -901,7 +901,7 @@
                 <a:schemeClr val="lt1"/>
               </a:buClr>
               <a:buSzPct val="100000"/>
-              <a:defRPr sz="23700">
+              <a:defRPr sz="20313">
                 <a:solidFill>
                   <a:schemeClr val="lt1"/>
                 </a:solidFill>
@@ -915,7 +915,7 @@
                 <a:schemeClr val="lt1"/>
               </a:buClr>
               <a:buSzPct val="100000"/>
-              <a:defRPr sz="23700">
+              <a:defRPr sz="20313">
                 <a:solidFill>
                   <a:schemeClr val="lt1"/>
                 </a:solidFill>
@@ -929,7 +929,7 @@
                 <a:schemeClr val="lt1"/>
               </a:buClr>
               <a:buSzPct val="100000"/>
-              <a:defRPr sz="23700">
+              <a:defRPr sz="20313">
                 <a:solidFill>
                   <a:schemeClr val="lt1"/>
                 </a:solidFill>
@@ -943,7 +943,7 @@
                 <a:schemeClr val="lt1"/>
               </a:buClr>
               <a:buSzPct val="100000"/>
-              <a:defRPr sz="23700">
+              <a:defRPr sz="20313">
                 <a:solidFill>
                   <a:schemeClr val="lt1"/>
                 </a:solidFill>
@@ -957,7 +957,7 @@
                 <a:schemeClr val="lt1"/>
               </a:buClr>
               <a:buSzPct val="100000"/>
-              <a:defRPr sz="23700">
+              <a:defRPr sz="20313">
                 <a:solidFill>
                   <a:schemeClr val="lt1"/>
                 </a:solidFill>
@@ -971,7 +971,7 @@
                 <a:schemeClr val="lt1"/>
               </a:buClr>
               <a:buSzPct val="100000"/>
-              <a:defRPr sz="23700">
+              <a:defRPr sz="20313">
                 <a:solidFill>
                   <a:schemeClr val="lt1"/>
                 </a:solidFill>
@@ -985,7 +985,7 @@
                 <a:schemeClr val="lt1"/>
               </a:buClr>
               <a:buSzPct val="100000"/>
-              <a:defRPr sz="23700">
+              <a:defRPr sz="20313">
                 <a:solidFill>
                   <a:schemeClr val="lt1"/>
                 </a:solidFill>
@@ -1009,8 +1009,8 @@
         </p:nvSpPr>
         <p:spPr>
           <a:xfrm>
-            <a:off x="2511970" y="23175790"/>
-            <a:ext cx="34532698" cy="3694200"/>
+            <a:off x="2153117" y="23175790"/>
+            <a:ext cx="29599455" cy="3694200"/>
           </a:xfrm>
           <a:prstGeom prst="rect">
             <a:avLst/>
@@ -1034,7 +1034,7 @@
               </a:buClr>
               <a:buSzPct val="100000"/>
               <a:buNone/>
-              <a:defRPr sz="11900">
+              <a:defRPr sz="10199">
                 <a:solidFill>
                   <a:schemeClr val="lt1"/>
                 </a:solidFill>
@@ -1055,7 +1055,7 @@
               </a:buClr>
               <a:buSzPct val="100000"/>
               <a:buNone/>
-              <a:defRPr sz="11900">
+              <a:defRPr sz="10199">
                 <a:solidFill>
                   <a:schemeClr val="lt1"/>
                 </a:solidFill>
@@ -1076,7 +1076,7 @@
               </a:buClr>
               <a:buSzPct val="100000"/>
               <a:buNone/>
-              <a:defRPr sz="11900">
+              <a:defRPr sz="10199">
                 <a:solidFill>
                   <a:schemeClr val="lt1"/>
                 </a:solidFill>
@@ -1097,7 +1097,7 @@
               </a:buClr>
               <a:buSzPct val="100000"/>
               <a:buNone/>
-              <a:defRPr sz="11900">
+              <a:defRPr sz="10199">
                 <a:solidFill>
                   <a:schemeClr val="lt1"/>
                 </a:solidFill>
@@ -1118,7 +1118,7 @@
               </a:buClr>
               <a:buSzPct val="100000"/>
               <a:buNone/>
-              <a:defRPr sz="11900">
+              <a:defRPr sz="10199">
                 <a:solidFill>
                   <a:schemeClr val="lt1"/>
                 </a:solidFill>
@@ -1139,7 +1139,7 @@
               </a:buClr>
               <a:buSzPct val="100000"/>
               <a:buNone/>
-              <a:defRPr sz="11900">
+              <a:defRPr sz="10199">
                 <a:solidFill>
                   <a:schemeClr val="lt1"/>
                 </a:solidFill>
@@ -1160,7 +1160,7 @@
               </a:buClr>
               <a:buSzPct val="100000"/>
               <a:buNone/>
-              <a:defRPr sz="11900">
+              <a:defRPr sz="10199">
                 <a:solidFill>
                   <a:schemeClr val="lt1"/>
                 </a:solidFill>
@@ -1181,7 +1181,7 @@
               </a:buClr>
               <a:buSzPct val="100000"/>
               <a:buNone/>
-              <a:defRPr sz="11900">
+              <a:defRPr sz="10199">
                 <a:solidFill>
                   <a:schemeClr val="lt1"/>
                 </a:solidFill>
@@ -1202,7 +1202,7 @@
               </a:buClr>
               <a:buSzPct val="100000"/>
               <a:buNone/>
-              <a:defRPr sz="11900">
+              <a:defRPr sz="10199">
                 <a:solidFill>
                   <a:schemeClr val="lt1"/>
                 </a:solidFill>
@@ -1226,8 +1226,8 @@
         </p:nvSpPr>
         <p:spPr>
           <a:xfrm>
-            <a:off x="35533812" y="39690156"/>
-            <a:ext cx="2304599" cy="3358800"/>
+            <a:off x="30457553" y="39690156"/>
+            <a:ext cx="1975371" cy="3358800"/>
           </a:xfrm>
           <a:prstGeom prst="rect">
             <a:avLst/>
@@ -1239,14 +1239,9 @@
           </a:bodyPr>
           <a:lstStyle/>
           <a:p>
-            <a:pPr>
-              <a:spcBef>
-                <a:spcPts val="0"/>
-              </a:spcBef>
-              <a:buNone/>
-            </a:pPr>
             <a:fld id="{00000000-1234-1234-1234-123412341234}" type="slidenum">
-              <a:rPr lang="en"/>
+              <a:rPr lang="en" smtClean="0"/>
+              <a:pPr/>
               <a:t>‹#›</a:t>
             </a:fld>
             <a:endParaRPr lang="en"/>
@@ -1294,8 +1289,8 @@
         </p:nvGrpSpPr>
         <p:grpSpPr>
           <a:xfrm>
-            <a:off x="25613186" y="41"/>
-            <a:ext cx="12791624" cy="17327466"/>
+            <a:off x="21954160" y="41"/>
+            <a:ext cx="10964249" cy="17327466"/>
             <a:chOff x="6098378" y="4"/>
             <a:chExt cx="3045625" cy="2030570"/>
           </a:xfrm>
@@ -1333,7 +1328,7 @@
                 </a:spcBef>
                 <a:buNone/>
               </a:pPr>
-              <a:endParaRPr/>
+              <a:endParaRPr sz="1200"/>
             </a:p>
           </p:txBody>
         </p:sp>
@@ -1370,7 +1365,7 @@
                 </a:spcBef>
                 <a:buNone/>
               </a:pPr>
-              <a:endParaRPr/>
+              <a:endParaRPr sz="1200"/>
             </a:p>
           </p:txBody>
         </p:sp>
@@ -1407,7 +1402,7 @@
                 </a:spcBef>
                 <a:buNone/>
               </a:pPr>
-              <a:endParaRPr/>
+              <a:endParaRPr sz="1200"/>
             </a:p>
           </p:txBody>
         </p:sp>
@@ -1444,7 +1439,7 @@
                 </a:spcBef>
                 <a:buNone/>
               </a:pPr>
-              <a:endParaRPr/>
+              <a:endParaRPr sz="1200"/>
             </a:p>
           </p:txBody>
         </p:sp>
@@ -1481,7 +1476,7 @@
                 </a:spcBef>
                 <a:buNone/>
               </a:pPr>
-              <a:endParaRPr/>
+              <a:endParaRPr sz="1200"/>
             </a:p>
           </p:txBody>
         </p:sp>
@@ -1498,8 +1493,8 @@
         </p:nvSpPr>
         <p:spPr>
           <a:xfrm>
-            <a:off x="1309140" y="10718292"/>
-            <a:ext cx="35786398" cy="17328599"/>
+            <a:off x="1122120" y="10718293"/>
+            <a:ext cx="30674055" cy="17328599"/>
           </a:xfrm>
           <a:prstGeom prst="rect">
             <a:avLst/>
@@ -1516,7 +1511,7 @@
                 <a:schemeClr val="lt1"/>
               </a:buClr>
               <a:buSzPct val="100000"/>
-              <a:defRPr sz="67700">
+              <a:defRPr sz="58026">
                 <a:solidFill>
                   <a:schemeClr val="lt1"/>
                 </a:solidFill>
@@ -1530,7 +1525,7 @@
                 <a:schemeClr val="lt1"/>
               </a:buClr>
               <a:buSzPct val="100000"/>
-              <a:defRPr sz="67700">
+              <a:defRPr sz="58026">
                 <a:solidFill>
                   <a:schemeClr val="lt1"/>
                 </a:solidFill>
@@ -1544,7 +1539,7 @@
                 <a:schemeClr val="lt1"/>
               </a:buClr>
               <a:buSzPct val="100000"/>
-              <a:defRPr sz="67700">
+              <a:defRPr sz="58026">
                 <a:solidFill>
                   <a:schemeClr val="lt1"/>
                 </a:solidFill>
@@ -1558,7 +1553,7 @@
                 <a:schemeClr val="lt1"/>
               </a:buClr>
               <a:buSzPct val="100000"/>
-              <a:defRPr sz="67700">
+              <a:defRPr sz="58026">
                 <a:solidFill>
                   <a:schemeClr val="lt1"/>
                 </a:solidFill>
@@ -1572,7 +1567,7 @@
                 <a:schemeClr val="lt1"/>
               </a:buClr>
               <a:buSzPct val="100000"/>
-              <a:defRPr sz="67700">
+              <a:defRPr sz="58026">
                 <a:solidFill>
                   <a:schemeClr val="lt1"/>
                 </a:solidFill>
@@ -1586,7 +1581,7 @@
                 <a:schemeClr val="lt1"/>
               </a:buClr>
               <a:buSzPct val="100000"/>
-              <a:defRPr sz="67700">
+              <a:defRPr sz="58026">
                 <a:solidFill>
                   <a:schemeClr val="lt1"/>
                 </a:solidFill>
@@ -1600,7 +1595,7 @@
                 <a:schemeClr val="lt1"/>
               </a:buClr>
               <a:buSzPct val="100000"/>
-              <a:defRPr sz="67700">
+              <a:defRPr sz="58026">
                 <a:solidFill>
                   <a:schemeClr val="lt1"/>
                 </a:solidFill>
@@ -1614,7 +1609,7 @@
                 <a:schemeClr val="lt1"/>
               </a:buClr>
               <a:buSzPct val="100000"/>
-              <a:defRPr sz="67700">
+              <a:defRPr sz="58026">
                 <a:solidFill>
                   <a:schemeClr val="lt1"/>
                 </a:solidFill>
@@ -1628,7 +1623,7 @@
                 <a:schemeClr val="lt1"/>
               </a:buClr>
               <a:buSzPct val="100000"/>
-              <a:defRPr sz="67700">
+              <a:defRPr sz="58026">
                 <a:solidFill>
                   <a:schemeClr val="lt1"/>
                 </a:solidFill>
@@ -1652,8 +1647,8 @@
         </p:nvSpPr>
         <p:spPr>
           <a:xfrm>
-            <a:off x="1309140" y="28750718"/>
-            <a:ext cx="35786398" cy="10938900"/>
+            <a:off x="1122120" y="28750718"/>
+            <a:ext cx="30674055" cy="10938900"/>
           </a:xfrm>
           <a:prstGeom prst="rect">
             <a:avLst/>
@@ -1797,8 +1792,8 @@
         </p:nvSpPr>
         <p:spPr>
           <a:xfrm>
-            <a:off x="35533812" y="39690156"/>
-            <a:ext cx="2304599" cy="3358800"/>
+            <a:off x="30457553" y="39690156"/>
+            <a:ext cx="1975371" cy="3358800"/>
           </a:xfrm>
           <a:prstGeom prst="rect">
             <a:avLst/>
@@ -1810,14 +1805,9 @@
           </a:bodyPr>
           <a:lstStyle/>
           <a:p>
-            <a:pPr>
-              <a:spcBef>
-                <a:spcPts val="0"/>
-              </a:spcBef>
-              <a:buNone/>
-            </a:pPr>
             <a:fld id="{00000000-1234-1234-1234-123412341234}" type="slidenum">
-              <a:rPr lang="en"/>
+              <a:rPr lang="en" smtClean="0"/>
+              <a:pPr/>
               <a:t>‹#›</a:t>
             </a:fld>
             <a:endParaRPr lang="en"/>
@@ -1861,8 +1851,8 @@
         </p:nvSpPr>
         <p:spPr>
           <a:xfrm>
-            <a:off x="35533812" y="39690156"/>
-            <a:ext cx="2304599" cy="3358800"/>
+            <a:off x="30457553" y="39690156"/>
+            <a:ext cx="1975371" cy="3358800"/>
           </a:xfrm>
           <a:prstGeom prst="rect">
             <a:avLst/>
@@ -1874,18 +1864,13 @@
           </a:bodyPr>
           <a:lstStyle/>
           <a:p>
-            <a:pPr>
-              <a:spcBef>
-                <a:spcPts val="0"/>
-              </a:spcBef>
-              <a:buNone/>
-            </a:pPr>
             <a:fld id="{00000000-1234-1234-1234-123412341234}" type="slidenum">
-              <a:rPr lang="en">
+              <a:rPr lang="en" smtClean="0">
                 <a:solidFill>
                   <a:schemeClr val="dk2"/>
                 </a:solidFill>
               </a:rPr>
+              <a:pPr/>
               <a:t>‹#›</a:t>
             </a:fld>
             <a:endParaRPr lang="en">
@@ -1937,8 +1922,8 @@
         </p:nvGrpSpPr>
         <p:grpSpPr>
           <a:xfrm>
-            <a:off x="25613186" y="41"/>
-            <a:ext cx="12791624" cy="17327466"/>
+            <a:off x="21954160" y="41"/>
+            <a:ext cx="10964249" cy="17327466"/>
             <a:chOff x="6098378" y="4"/>
             <a:chExt cx="3045625" cy="2030570"/>
           </a:xfrm>
@@ -1976,7 +1961,7 @@
                 </a:spcBef>
                 <a:buNone/>
               </a:pPr>
-              <a:endParaRPr/>
+              <a:endParaRPr sz="1200"/>
             </a:p>
           </p:txBody>
         </p:sp>
@@ -2013,7 +1998,7 @@
                 </a:spcBef>
                 <a:buNone/>
               </a:pPr>
-              <a:endParaRPr/>
+              <a:endParaRPr sz="1200"/>
             </a:p>
           </p:txBody>
         </p:sp>
@@ -2050,7 +2035,7 @@
                 </a:spcBef>
                 <a:buNone/>
               </a:pPr>
-              <a:endParaRPr/>
+              <a:endParaRPr sz="1200"/>
             </a:p>
           </p:txBody>
         </p:sp>
@@ -2087,7 +2072,7 @@
                 </a:spcBef>
                 <a:buNone/>
               </a:pPr>
-              <a:endParaRPr/>
+              <a:endParaRPr sz="1200"/>
             </a:p>
           </p:txBody>
         </p:sp>
@@ -2124,7 +2109,7 @@
                 </a:spcBef>
                 <a:buNone/>
               </a:pPr>
-              <a:endParaRPr/>
+              <a:endParaRPr sz="1200"/>
             </a:p>
           </p:txBody>
         </p:sp>
@@ -2141,8 +2126,8 @@
         </p:nvSpPr>
         <p:spPr>
           <a:xfrm>
-            <a:off x="2512019" y="18366696"/>
-            <a:ext cx="34532698" cy="7157700"/>
+            <a:off x="2153159" y="18366696"/>
+            <a:ext cx="29599455" cy="7157700"/>
           </a:xfrm>
           <a:prstGeom prst="rect">
             <a:avLst/>
@@ -2159,7 +2144,7 @@
                 <a:schemeClr val="lt1"/>
               </a:buClr>
               <a:buSzPct val="100000"/>
-              <a:defRPr sz="23700">
+              <a:defRPr sz="20313">
                 <a:solidFill>
                   <a:schemeClr val="lt1"/>
                 </a:solidFill>
@@ -2173,7 +2158,7 @@
                 <a:schemeClr val="lt1"/>
               </a:buClr>
               <a:buSzPct val="100000"/>
-              <a:defRPr sz="23700">
+              <a:defRPr sz="20313">
                 <a:solidFill>
                   <a:schemeClr val="lt1"/>
                 </a:solidFill>
@@ -2187,7 +2172,7 @@
                 <a:schemeClr val="lt1"/>
               </a:buClr>
               <a:buSzPct val="100000"/>
-              <a:defRPr sz="23700">
+              <a:defRPr sz="20313">
                 <a:solidFill>
                   <a:schemeClr val="lt1"/>
                 </a:solidFill>
@@ -2201,7 +2186,7 @@
                 <a:schemeClr val="lt1"/>
               </a:buClr>
               <a:buSzPct val="100000"/>
-              <a:defRPr sz="23700">
+              <a:defRPr sz="20313">
                 <a:solidFill>
                   <a:schemeClr val="lt1"/>
                 </a:solidFill>
@@ -2215,7 +2200,7 @@
                 <a:schemeClr val="lt1"/>
               </a:buClr>
               <a:buSzPct val="100000"/>
-              <a:defRPr sz="23700">
+              <a:defRPr sz="20313">
                 <a:solidFill>
                   <a:schemeClr val="lt1"/>
                 </a:solidFill>
@@ -2229,7 +2214,7 @@
                 <a:schemeClr val="lt1"/>
               </a:buClr>
               <a:buSzPct val="100000"/>
-              <a:defRPr sz="23700">
+              <a:defRPr sz="20313">
                 <a:solidFill>
                   <a:schemeClr val="lt1"/>
                 </a:solidFill>
@@ -2243,7 +2228,7 @@
                 <a:schemeClr val="lt1"/>
               </a:buClr>
               <a:buSzPct val="100000"/>
-              <a:defRPr sz="23700">
+              <a:defRPr sz="20313">
                 <a:solidFill>
                   <a:schemeClr val="lt1"/>
                 </a:solidFill>
@@ -2257,7 +2242,7 @@
                 <a:schemeClr val="lt1"/>
               </a:buClr>
               <a:buSzPct val="100000"/>
-              <a:defRPr sz="23700">
+              <a:defRPr sz="20313">
                 <a:solidFill>
                   <a:schemeClr val="lt1"/>
                 </a:solidFill>
@@ -2271,7 +2256,7 @@
                 <a:schemeClr val="lt1"/>
               </a:buClr>
               <a:buSzPct val="100000"/>
-              <a:defRPr sz="23700">
+              <a:defRPr sz="20313">
                 <a:solidFill>
                   <a:schemeClr val="lt1"/>
                 </a:solidFill>
@@ -2295,8 +2280,8 @@
         </p:nvSpPr>
         <p:spPr>
           <a:xfrm>
-            <a:off x="35533812" y="39690156"/>
-            <a:ext cx="2304599" cy="3358800"/>
+            <a:off x="30457553" y="39690156"/>
+            <a:ext cx="1975371" cy="3358800"/>
           </a:xfrm>
           <a:prstGeom prst="rect">
             <a:avLst/>
@@ -2308,14 +2293,9 @@
           </a:bodyPr>
           <a:lstStyle/>
           <a:p>
-            <a:pPr>
-              <a:spcBef>
-                <a:spcPts val="0"/>
-              </a:spcBef>
-              <a:buNone/>
-            </a:pPr>
             <a:fld id="{00000000-1234-1234-1234-123412341234}" type="slidenum">
-              <a:rPr lang="en"/>
+              <a:rPr lang="en" smtClean="0"/>
+              <a:pPr/>
               <a:t>‹#›</a:t>
             </a:fld>
             <a:endParaRPr lang="en"/>
@@ -2355,8 +2335,8 @@
         </p:nvGrpSpPr>
         <p:grpSpPr>
           <a:xfrm>
-            <a:off x="0" y="33311181"/>
-            <a:ext cx="38404799" cy="10580652"/>
+            <a:off x="1" y="33311181"/>
+            <a:ext cx="32918399" cy="10580652"/>
             <a:chOff x="0" y="3903669"/>
             <a:chExt cx="9144000" cy="1239924"/>
           </a:xfrm>
@@ -2394,7 +2374,7 @@
                 </a:spcBef>
                 <a:buNone/>
               </a:pPr>
-              <a:endParaRPr/>
+              <a:endParaRPr sz="1200"/>
             </a:p>
           </p:txBody>
         </p:sp>
@@ -2431,7 +2411,7 @@
                 </a:spcBef>
                 <a:buNone/>
               </a:pPr>
-              <a:endParaRPr/>
+              <a:endParaRPr sz="1200"/>
             </a:p>
           </p:txBody>
         </p:sp>
@@ -2468,7 +2448,7 @@
                 </a:spcBef>
                 <a:buNone/>
               </a:pPr>
-              <a:endParaRPr/>
+              <a:endParaRPr sz="1200"/>
             </a:p>
           </p:txBody>
         </p:sp>
@@ -2505,7 +2485,7 @@
                 </a:spcBef>
                 <a:buNone/>
               </a:pPr>
-              <a:endParaRPr/>
+              <a:endParaRPr sz="1200"/>
             </a:p>
           </p:txBody>
         </p:sp>
@@ -2542,7 +2522,7 @@
                 </a:spcBef>
                 <a:buNone/>
               </a:pPr>
-              <a:endParaRPr/>
+              <a:endParaRPr sz="1200"/>
             </a:p>
           </p:txBody>
         </p:sp>
@@ -2559,8 +2539,8 @@
         </p:nvSpPr>
         <p:spPr>
           <a:xfrm>
-            <a:off x="1309140" y="3498666"/>
-            <a:ext cx="35786398" cy="5186699"/>
+            <a:off x="1122120" y="3498667"/>
+            <a:ext cx="30674055" cy="5186699"/>
           </a:xfrm>
           <a:prstGeom prst="rect">
             <a:avLst/>
@@ -2641,8 +2621,8 @@
         </p:nvSpPr>
         <p:spPr>
           <a:xfrm>
-            <a:off x="1309140" y="10494933"/>
-            <a:ext cx="35786398" cy="28492798"/>
+            <a:off x="1122120" y="10494933"/>
+            <a:ext cx="30674055" cy="28492798"/>
           </a:xfrm>
           <a:prstGeom prst="rect">
             <a:avLst/>
@@ -2723,8 +2703,8 @@
         </p:nvSpPr>
         <p:spPr>
           <a:xfrm>
-            <a:off x="35533812" y="39690156"/>
-            <a:ext cx="2304599" cy="3358800"/>
+            <a:off x="30457553" y="39690156"/>
+            <a:ext cx="1975371" cy="3358800"/>
           </a:xfrm>
           <a:prstGeom prst="rect">
             <a:avLst/>
@@ -2736,14 +2716,9 @@
           </a:bodyPr>
           <a:lstStyle/>
           <a:p>
-            <a:pPr>
-              <a:spcBef>
-                <a:spcPts val="0"/>
-              </a:spcBef>
-              <a:buNone/>
-            </a:pPr>
             <a:fld id="{00000000-1234-1234-1234-123412341234}" type="slidenum">
-              <a:rPr lang="en"/>
+              <a:rPr lang="en" smtClean="0"/>
+              <a:pPr/>
               <a:t>‹#›</a:t>
             </a:fld>
             <a:endParaRPr lang="en"/>
@@ -2787,8 +2762,8 @@
         </p:nvSpPr>
         <p:spPr>
           <a:xfrm>
-            <a:off x="1309140" y="3498666"/>
-            <a:ext cx="35786398" cy="5186699"/>
+            <a:off x="1122120" y="3498667"/>
+            <a:ext cx="30674055" cy="5186699"/>
           </a:xfrm>
           <a:prstGeom prst="rect">
             <a:avLst/>
@@ -2869,8 +2844,8 @@
         </p:nvSpPr>
         <p:spPr>
           <a:xfrm>
-            <a:off x="1309140" y="10495786"/>
-            <a:ext cx="16799699" cy="28492798"/>
+            <a:off x="1122120" y="10495786"/>
+            <a:ext cx="14399742" cy="28492798"/>
           </a:xfrm>
           <a:prstGeom prst="rect">
             <a:avLst/>
@@ -2884,63 +2859,63 @@
                 <a:spcPts val="0"/>
               </a:spcBef>
               <a:buSzPct val="100000"/>
-              <a:defRPr sz="7900"/>
+              <a:defRPr sz="6771"/>
             </a:lvl1pPr>
             <a:lvl2pPr>
               <a:spcBef>
                 <a:spcPts val="0"/>
               </a:spcBef>
               <a:buSzPct val="100000"/>
-              <a:defRPr sz="6800"/>
+              <a:defRPr sz="5828"/>
             </a:lvl2pPr>
             <a:lvl3pPr>
               <a:spcBef>
                 <a:spcPts val="0"/>
               </a:spcBef>
               <a:buSzPct val="100000"/>
-              <a:defRPr sz="6800"/>
+              <a:defRPr sz="5828"/>
             </a:lvl3pPr>
             <a:lvl4pPr>
               <a:spcBef>
                 <a:spcPts val="0"/>
               </a:spcBef>
               <a:buSzPct val="100000"/>
-              <a:defRPr sz="6800"/>
+              <a:defRPr sz="5828"/>
             </a:lvl4pPr>
             <a:lvl5pPr>
               <a:spcBef>
                 <a:spcPts val="0"/>
               </a:spcBef>
               <a:buSzPct val="100000"/>
-              <a:defRPr sz="6800"/>
+              <a:defRPr sz="5828"/>
             </a:lvl5pPr>
             <a:lvl6pPr>
               <a:spcBef>
                 <a:spcPts val="0"/>
               </a:spcBef>
               <a:buSzPct val="100000"/>
-              <a:defRPr sz="6800"/>
+              <a:defRPr sz="5828"/>
             </a:lvl6pPr>
             <a:lvl7pPr>
               <a:spcBef>
                 <a:spcPts val="0"/>
               </a:spcBef>
               <a:buSzPct val="100000"/>
-              <a:defRPr sz="6800"/>
+              <a:defRPr sz="5828"/>
             </a:lvl7pPr>
             <a:lvl8pPr>
               <a:spcBef>
                 <a:spcPts val="0"/>
               </a:spcBef>
               <a:buSzPct val="100000"/>
-              <a:defRPr sz="6800"/>
+              <a:defRPr sz="5828"/>
             </a:lvl8pPr>
             <a:lvl9pPr>
               <a:spcBef>
                 <a:spcPts val="0"/>
               </a:spcBef>
               <a:buSzPct val="100000"/>
-              <a:defRPr sz="6800"/>
+              <a:defRPr sz="5828"/>
             </a:lvl9pPr>
           </a:lstStyle>
           <a:p>
@@ -2960,8 +2935,8 @@
         </p:nvSpPr>
         <p:spPr>
           <a:xfrm>
-            <a:off x="20296079" y="10495786"/>
-            <a:ext cx="16799699" cy="28492798"/>
+            <a:off x="17396640" y="10495786"/>
+            <a:ext cx="14399742" cy="28492798"/>
           </a:xfrm>
           <a:prstGeom prst="rect">
             <a:avLst/>
@@ -2975,63 +2950,63 @@
                 <a:spcPts val="0"/>
               </a:spcBef>
               <a:buSzPct val="100000"/>
-              <a:defRPr sz="7900"/>
+              <a:defRPr sz="6771"/>
             </a:lvl1pPr>
             <a:lvl2pPr>
               <a:spcBef>
                 <a:spcPts val="0"/>
               </a:spcBef>
               <a:buSzPct val="100000"/>
-              <a:defRPr sz="6800"/>
+              <a:defRPr sz="5828"/>
             </a:lvl2pPr>
             <a:lvl3pPr>
               <a:spcBef>
                 <a:spcPts val="0"/>
               </a:spcBef>
               <a:buSzPct val="100000"/>
-              <a:defRPr sz="6800"/>
+              <a:defRPr sz="5828"/>
             </a:lvl3pPr>
             <a:lvl4pPr>
               <a:spcBef>
                 <a:spcPts val="0"/>
               </a:spcBef>
               <a:buSzPct val="100000"/>
-              <a:defRPr sz="6800"/>
+              <a:defRPr sz="5828"/>
             </a:lvl4pPr>
             <a:lvl5pPr>
               <a:spcBef>
                 <a:spcPts val="0"/>
               </a:spcBef>
               <a:buSzPct val="100000"/>
-              <a:defRPr sz="6800"/>
+              <a:defRPr sz="5828"/>
             </a:lvl5pPr>
             <a:lvl6pPr>
               <a:spcBef>
                 <a:spcPts val="0"/>
               </a:spcBef>
               <a:buSzPct val="100000"/>
-              <a:defRPr sz="6800"/>
+              <a:defRPr sz="5828"/>
             </a:lvl6pPr>
             <a:lvl7pPr>
               <a:spcBef>
                 <a:spcPts val="0"/>
               </a:spcBef>
               <a:buSzPct val="100000"/>
-              <a:defRPr sz="6800"/>
+              <a:defRPr sz="5828"/>
             </a:lvl7pPr>
             <a:lvl8pPr>
               <a:spcBef>
                 <a:spcPts val="0"/>
               </a:spcBef>
               <a:buSzPct val="100000"/>
-              <a:defRPr sz="6800"/>
+              <a:defRPr sz="5828"/>
             </a:lvl8pPr>
             <a:lvl9pPr>
               <a:spcBef>
                 <a:spcPts val="0"/>
               </a:spcBef>
               <a:buSzPct val="100000"/>
-              <a:defRPr sz="6800"/>
+              <a:defRPr sz="5828"/>
             </a:lvl9pPr>
           </a:lstStyle>
           <a:p>
@@ -3051,8 +3026,8 @@
         </p:nvSpPr>
         <p:spPr>
           <a:xfrm>
-            <a:off x="35533812" y="39690156"/>
-            <a:ext cx="2304599" cy="3358800"/>
+            <a:off x="30457553" y="39690156"/>
+            <a:ext cx="1975371" cy="3358800"/>
           </a:xfrm>
           <a:prstGeom prst="rect">
             <a:avLst/>
@@ -3064,18 +3039,13 @@
           </a:bodyPr>
           <a:lstStyle/>
           <a:p>
-            <a:pPr>
-              <a:spcBef>
-                <a:spcPts val="0"/>
-              </a:spcBef>
-              <a:buNone/>
-            </a:pPr>
             <a:fld id="{00000000-1234-1234-1234-123412341234}" type="slidenum">
-              <a:rPr lang="en">
+              <a:rPr lang="en" smtClean="0">
                 <a:solidFill>
                   <a:schemeClr val="dk2"/>
                 </a:solidFill>
               </a:rPr>
+              <a:pPr/>
               <a:t>‹#›</a:t>
             </a:fld>
             <a:endParaRPr lang="en">
@@ -3123,8 +3093,8 @@
         </p:nvSpPr>
         <p:spPr>
           <a:xfrm>
-            <a:off x="1309140" y="3498666"/>
-            <a:ext cx="35786398" cy="5186699"/>
+            <a:off x="1122120" y="3498667"/>
+            <a:ext cx="30674055" cy="5186699"/>
           </a:xfrm>
           <a:prstGeom prst="rect">
             <a:avLst/>
@@ -3205,8 +3175,8 @@
         </p:nvSpPr>
         <p:spPr>
           <a:xfrm>
-            <a:off x="35533812" y="39690156"/>
-            <a:ext cx="2304599" cy="3358800"/>
+            <a:off x="30457553" y="39690156"/>
+            <a:ext cx="1975371" cy="3358800"/>
           </a:xfrm>
           <a:prstGeom prst="rect">
             <a:avLst/>
@@ -3218,18 +3188,13 @@
           </a:bodyPr>
           <a:lstStyle/>
           <a:p>
-            <a:pPr>
-              <a:spcBef>
-                <a:spcPts val="0"/>
-              </a:spcBef>
-              <a:buNone/>
-            </a:pPr>
             <a:fld id="{00000000-1234-1234-1234-123412341234}" type="slidenum">
-              <a:rPr lang="en">
+              <a:rPr lang="en" smtClean="0">
                 <a:solidFill>
                   <a:schemeClr val="dk2"/>
                 </a:solidFill>
               </a:rPr>
+              <a:pPr/>
               <a:t>‹#›</a:t>
             </a:fld>
             <a:endParaRPr lang="en">
@@ -3277,8 +3242,8 @@
         </p:nvSpPr>
         <p:spPr>
           <a:xfrm>
-            <a:off x="1309140" y="4741119"/>
-            <a:ext cx="11793600" cy="6448499"/>
+            <a:off x="1122120" y="4741120"/>
+            <a:ext cx="10108800" cy="6448499"/>
           </a:xfrm>
           <a:prstGeom prst="rect">
             <a:avLst/>
@@ -3292,63 +3257,63 @@
                 <a:spcPts val="0"/>
               </a:spcBef>
               <a:buSzPct val="100000"/>
-              <a:defRPr sz="13500"/>
+              <a:defRPr sz="11571"/>
             </a:lvl1pPr>
             <a:lvl2pPr>
               <a:spcBef>
                 <a:spcPts val="0"/>
               </a:spcBef>
               <a:buSzPct val="100000"/>
-              <a:defRPr sz="13500"/>
+              <a:defRPr sz="11571"/>
             </a:lvl2pPr>
             <a:lvl3pPr>
               <a:spcBef>
                 <a:spcPts val="0"/>
               </a:spcBef>
               <a:buSzPct val="100000"/>
-              <a:defRPr sz="13500"/>
+              <a:defRPr sz="11571"/>
             </a:lvl3pPr>
             <a:lvl4pPr>
               <a:spcBef>
                 <a:spcPts val="0"/>
               </a:spcBef>
               <a:buSzPct val="100000"/>
-              <a:defRPr sz="13500"/>
+              <a:defRPr sz="11571"/>
             </a:lvl4pPr>
             <a:lvl5pPr>
               <a:spcBef>
                 <a:spcPts val="0"/>
               </a:spcBef>
               <a:buSzPct val="100000"/>
-              <a:defRPr sz="13500"/>
+              <a:defRPr sz="11571"/>
             </a:lvl5pPr>
             <a:lvl6pPr>
               <a:spcBef>
                 <a:spcPts val="0"/>
               </a:spcBef>
               <a:buSzPct val="100000"/>
-              <a:defRPr sz="13500"/>
+              <a:defRPr sz="11571"/>
             </a:lvl6pPr>
             <a:lvl7pPr>
               <a:spcBef>
                 <a:spcPts val="0"/>
               </a:spcBef>
               <a:buSzPct val="100000"/>
-              <a:defRPr sz="13500"/>
+              <a:defRPr sz="11571"/>
             </a:lvl7pPr>
             <a:lvl8pPr>
               <a:spcBef>
                 <a:spcPts val="0"/>
               </a:spcBef>
               <a:buSzPct val="100000"/>
-              <a:defRPr sz="13500"/>
+              <a:defRPr sz="11571"/>
             </a:lvl8pPr>
             <a:lvl9pPr>
               <a:spcBef>
                 <a:spcPts val="0"/>
               </a:spcBef>
               <a:buSzPct val="100000"/>
-              <a:defRPr sz="13500"/>
+              <a:defRPr sz="11571"/>
             </a:lvl9pPr>
           </a:lstStyle>
           <a:p>
@@ -3368,8 +3333,8 @@
         </p:nvSpPr>
         <p:spPr>
           <a:xfrm>
-            <a:off x="1309140" y="12508195"/>
-            <a:ext cx="11793600" cy="26480698"/>
+            <a:off x="1122120" y="12508195"/>
+            <a:ext cx="10108800" cy="26480698"/>
           </a:xfrm>
           <a:prstGeom prst="rect">
             <a:avLst/>
@@ -3383,63 +3348,63 @@
                 <a:spcPts val="0"/>
               </a:spcBef>
               <a:buSzPct val="100000"/>
-              <a:defRPr sz="6800"/>
+              <a:defRPr sz="5828"/>
             </a:lvl1pPr>
             <a:lvl2pPr>
               <a:spcBef>
                 <a:spcPts val="0"/>
               </a:spcBef>
               <a:buSzPct val="100000"/>
-              <a:defRPr sz="6800"/>
+              <a:defRPr sz="5828"/>
             </a:lvl2pPr>
             <a:lvl3pPr>
               <a:spcBef>
                 <a:spcPts val="0"/>
               </a:spcBef>
               <a:buSzPct val="100000"/>
-              <a:defRPr sz="6800"/>
+              <a:defRPr sz="5828"/>
             </a:lvl3pPr>
             <a:lvl4pPr>
               <a:spcBef>
                 <a:spcPts val="0"/>
               </a:spcBef>
               <a:buSzPct val="100000"/>
-              <a:defRPr sz="6800"/>
+              <a:defRPr sz="5828"/>
             </a:lvl4pPr>
             <a:lvl5pPr>
               <a:spcBef>
                 <a:spcPts val="0"/>
               </a:spcBef>
               <a:buSzPct val="100000"/>
-              <a:defRPr sz="6800"/>
+              <a:defRPr sz="5828"/>
             </a:lvl5pPr>
             <a:lvl6pPr>
               <a:spcBef>
                 <a:spcPts val="0"/>
               </a:spcBef>
               <a:buSzPct val="100000"/>
-              <a:defRPr sz="6800"/>
+              <a:defRPr sz="5828"/>
             </a:lvl6pPr>
             <a:lvl7pPr>
               <a:spcBef>
                 <a:spcPts val="0"/>
               </a:spcBef>
               <a:buSzPct val="100000"/>
-              <a:defRPr sz="6800"/>
+              <a:defRPr sz="5828"/>
             </a:lvl7pPr>
             <a:lvl8pPr>
               <a:spcBef>
                 <a:spcPts val="0"/>
               </a:spcBef>
               <a:buSzPct val="100000"/>
-              <a:defRPr sz="6800"/>
+              <a:defRPr sz="5828"/>
             </a:lvl8pPr>
             <a:lvl9pPr>
               <a:spcBef>
                 <a:spcPts val="0"/>
               </a:spcBef>
               <a:buSzPct val="100000"/>
-              <a:defRPr sz="6800"/>
+              <a:defRPr sz="5828"/>
             </a:lvl9pPr>
           </a:lstStyle>
           <a:p>
@@ -3459,8 +3424,8 @@
         </p:nvSpPr>
         <p:spPr>
           <a:xfrm>
-            <a:off x="35533812" y="39690156"/>
-            <a:ext cx="2304599" cy="3358800"/>
+            <a:off x="30457553" y="39690156"/>
+            <a:ext cx="1975371" cy="3358800"/>
           </a:xfrm>
           <a:prstGeom prst="rect">
             <a:avLst/>
@@ -3472,18 +3437,13 @@
           </a:bodyPr>
           <a:lstStyle/>
           <a:p>
-            <a:pPr>
-              <a:spcBef>
-                <a:spcPts val="0"/>
-              </a:spcBef>
-              <a:buNone/>
-            </a:pPr>
             <a:fld id="{00000000-1234-1234-1234-123412341234}" type="slidenum">
-              <a:rPr lang="en">
+              <a:rPr lang="en" smtClean="0">
                 <a:solidFill>
                   <a:schemeClr val="dk2"/>
                 </a:solidFill>
               </a:rPr>
+              <a:pPr/>
               <a:t>‹#›</a:t>
             </a:fld>
             <a:endParaRPr lang="en">
@@ -3535,8 +3495,8 @@
         </p:nvGrpSpPr>
         <p:grpSpPr>
           <a:xfrm>
-            <a:off x="25613186" y="41"/>
-            <a:ext cx="12791624" cy="17327466"/>
+            <a:off x="21954160" y="41"/>
+            <a:ext cx="10964249" cy="17327466"/>
             <a:chOff x="6098378" y="4"/>
             <a:chExt cx="3045625" cy="2030570"/>
           </a:xfrm>
@@ -3574,7 +3534,7 @@
                 </a:spcBef>
                 <a:buNone/>
               </a:pPr>
-              <a:endParaRPr/>
+              <a:endParaRPr sz="1200"/>
             </a:p>
           </p:txBody>
         </p:sp>
@@ -3611,7 +3571,7 @@
                 </a:spcBef>
                 <a:buNone/>
               </a:pPr>
-              <a:endParaRPr/>
+              <a:endParaRPr sz="1200"/>
             </a:p>
           </p:txBody>
         </p:sp>
@@ -3648,7 +3608,7 @@
                 </a:spcBef>
                 <a:buNone/>
               </a:pPr>
-              <a:endParaRPr/>
+              <a:endParaRPr sz="1200"/>
             </a:p>
           </p:txBody>
         </p:sp>
@@ -3685,7 +3645,7 @@
                 </a:spcBef>
                 <a:buNone/>
               </a:pPr>
-              <a:endParaRPr/>
+              <a:endParaRPr sz="1200"/>
             </a:p>
           </p:txBody>
         </p:sp>
@@ -3722,7 +3682,7 @@
                 </a:spcBef>
                 <a:buNone/>
               </a:pPr>
-              <a:endParaRPr/>
+              <a:endParaRPr sz="1200"/>
             </a:p>
           </p:txBody>
         </p:sp>
@@ -3739,8 +3699,8 @@
         </p:nvSpPr>
         <p:spPr>
           <a:xfrm>
-            <a:off x="2059050" y="4491519"/>
-            <a:ext cx="23598599" cy="34908299"/>
+            <a:off x="1764900" y="4491520"/>
+            <a:ext cx="20227371" cy="34908299"/>
           </a:xfrm>
           <a:prstGeom prst="rect">
             <a:avLst/>
@@ -3757,7 +3717,7 @@
                 <a:schemeClr val="lt1"/>
               </a:buClr>
               <a:buSzPct val="100000"/>
-              <a:defRPr sz="27100">
+              <a:defRPr sz="23227">
                 <a:solidFill>
                   <a:schemeClr val="lt1"/>
                 </a:solidFill>
@@ -3771,7 +3731,7 @@
                 <a:schemeClr val="lt1"/>
               </a:buClr>
               <a:buSzPct val="100000"/>
-              <a:defRPr sz="27100">
+              <a:defRPr sz="23227">
                 <a:solidFill>
                   <a:schemeClr val="lt1"/>
                 </a:solidFill>
@@ -3785,7 +3745,7 @@
                 <a:schemeClr val="lt1"/>
               </a:buClr>
               <a:buSzPct val="100000"/>
-              <a:defRPr sz="27100">
+              <a:defRPr sz="23227">
                 <a:solidFill>
                   <a:schemeClr val="lt1"/>
                 </a:solidFill>
@@ -3799,7 +3759,7 @@
                 <a:schemeClr val="lt1"/>
               </a:buClr>
               <a:buSzPct val="100000"/>
-              <a:defRPr sz="27100">
+              <a:defRPr sz="23227">
                 <a:solidFill>
                   <a:schemeClr val="lt1"/>
                 </a:solidFill>
@@ -3813,7 +3773,7 @@
                 <a:schemeClr val="lt1"/>
               </a:buClr>
               <a:buSzPct val="100000"/>
-              <a:defRPr sz="27100">
+              <a:defRPr sz="23227">
                 <a:solidFill>
                   <a:schemeClr val="lt1"/>
                 </a:solidFill>
@@ -3827,7 +3787,7 @@
                 <a:schemeClr val="lt1"/>
               </a:buClr>
               <a:buSzPct val="100000"/>
-              <a:defRPr sz="27100">
+              <a:defRPr sz="23227">
                 <a:solidFill>
                   <a:schemeClr val="lt1"/>
                 </a:solidFill>
@@ -3841,7 +3801,7 @@
                 <a:schemeClr val="lt1"/>
               </a:buClr>
               <a:buSzPct val="100000"/>
-              <a:defRPr sz="27100">
+              <a:defRPr sz="23227">
                 <a:solidFill>
                   <a:schemeClr val="lt1"/>
                 </a:solidFill>
@@ -3855,7 +3815,7 @@
                 <a:schemeClr val="lt1"/>
               </a:buClr>
               <a:buSzPct val="100000"/>
-              <a:defRPr sz="27100">
+              <a:defRPr sz="23227">
                 <a:solidFill>
                   <a:schemeClr val="lt1"/>
                 </a:solidFill>
@@ -3869,7 +3829,7 @@
                 <a:schemeClr val="lt1"/>
               </a:buClr>
               <a:buSzPct val="100000"/>
-              <a:defRPr sz="27100">
+              <a:defRPr sz="23227">
                 <a:solidFill>
                   <a:schemeClr val="lt1"/>
                 </a:solidFill>
@@ -3893,8 +3853,8 @@
         </p:nvSpPr>
         <p:spPr>
           <a:xfrm>
-            <a:off x="35533812" y="39690156"/>
-            <a:ext cx="2304599" cy="3358800"/>
+            <a:off x="30457553" y="39690156"/>
+            <a:ext cx="1975371" cy="3358800"/>
           </a:xfrm>
           <a:prstGeom prst="rect">
             <a:avLst/>
@@ -3906,14 +3866,9 @@
           </a:bodyPr>
           <a:lstStyle/>
           <a:p>
-            <a:pPr>
-              <a:spcBef>
-                <a:spcPts val="0"/>
-              </a:spcBef>
-              <a:buNone/>
-            </a:pPr>
             <a:fld id="{00000000-1234-1234-1234-123412341234}" type="slidenum">
-              <a:rPr lang="en"/>
+              <a:rPr lang="en" smtClean="0"/>
+              <a:pPr/>
               <a:t>‹#›</a:t>
             </a:fld>
             <a:endParaRPr lang="en"/>
@@ -3953,8 +3908,8 @@
         </p:nvSpPr>
         <p:spPr>
           <a:xfrm>
-            <a:off x="19202400" y="-1493"/>
-            <a:ext cx="19202400" cy="43891199"/>
+            <a:off x="16459200" y="-1493"/>
+            <a:ext cx="16459200" cy="43891199"/>
           </a:xfrm>
           <a:prstGeom prst="rect">
             <a:avLst/>
@@ -3967,7 +3922,7 @@
           </a:ln>
         </p:spPr>
         <p:txBody>
-          <a:bodyPr lIns="516050" tIns="516050" rIns="516050" bIns="516050" anchor="ctr" anchorCtr="0">
+          <a:bodyPr lIns="442329" tIns="442329" rIns="442329" bIns="442329" anchor="ctr" anchorCtr="0">
             <a:noAutofit/>
           </a:bodyPr>
           <a:lstStyle/>
@@ -3978,7 +3933,7 @@
               </a:spcBef>
               <a:buNone/>
             </a:pPr>
-            <a:endParaRPr/>
+            <a:endParaRPr sz="1200"/>
           </a:p>
         </p:txBody>
       </p:sp>
@@ -3990,8 +3945,8 @@
         </p:nvCxnSpPr>
         <p:spPr>
           <a:xfrm>
-            <a:off x="21124634" y="38361600"/>
-            <a:ext cx="1966800" cy="0"/>
+            <a:off x="18106829" y="38361600"/>
+            <a:ext cx="1685829" cy="0"/>
           </a:xfrm>
           <a:prstGeom prst="straightConnector1">
             <a:avLst/>
@@ -4020,8 +3975,8 @@
         </p:nvSpPr>
         <p:spPr>
           <a:xfrm>
-            <a:off x="1115100" y="9822720"/>
-            <a:ext cx="16989900" cy="13350299"/>
+            <a:off x="955800" y="9822720"/>
+            <a:ext cx="14562771" cy="13350299"/>
           </a:xfrm>
           <a:prstGeom prst="rect">
             <a:avLst/>
@@ -4035,63 +3990,63 @@
                 <a:spcPts val="0"/>
               </a:spcBef>
               <a:buSzPct val="100000"/>
-              <a:defRPr sz="23700"/>
+              <a:defRPr sz="20313"/>
             </a:lvl1pPr>
             <a:lvl2pPr algn="ctr">
               <a:spcBef>
                 <a:spcPts val="0"/>
               </a:spcBef>
               <a:buSzPct val="100000"/>
-              <a:defRPr sz="23700"/>
+              <a:defRPr sz="20313"/>
             </a:lvl2pPr>
             <a:lvl3pPr algn="ctr">
               <a:spcBef>
                 <a:spcPts val="0"/>
               </a:spcBef>
               <a:buSzPct val="100000"/>
-              <a:defRPr sz="23700"/>
+              <a:defRPr sz="20313"/>
             </a:lvl3pPr>
             <a:lvl4pPr algn="ctr">
               <a:spcBef>
                 <a:spcPts val="0"/>
               </a:spcBef>
               <a:buSzPct val="100000"/>
-              <a:defRPr sz="23700"/>
+              <a:defRPr sz="20313"/>
             </a:lvl4pPr>
             <a:lvl5pPr algn="ctr">
               <a:spcBef>
                 <a:spcPts val="0"/>
               </a:spcBef>
               <a:buSzPct val="100000"/>
-              <a:defRPr sz="23700"/>
+              <a:defRPr sz="20313"/>
             </a:lvl5pPr>
             <a:lvl6pPr algn="ctr">
               <a:spcBef>
                 <a:spcPts val="0"/>
               </a:spcBef>
               <a:buSzPct val="100000"/>
-              <a:defRPr sz="23700"/>
+              <a:defRPr sz="20313"/>
             </a:lvl6pPr>
             <a:lvl7pPr algn="ctr">
               <a:spcBef>
                 <a:spcPts val="0"/>
               </a:spcBef>
               <a:buSzPct val="100000"/>
-              <a:defRPr sz="23700"/>
+              <a:defRPr sz="20313"/>
             </a:lvl7pPr>
             <a:lvl8pPr algn="ctr">
               <a:spcBef>
                 <a:spcPts val="0"/>
               </a:spcBef>
               <a:buSzPct val="100000"/>
-              <a:defRPr sz="23700"/>
+              <a:defRPr sz="20313"/>
             </a:lvl8pPr>
             <a:lvl9pPr algn="ctr">
               <a:spcBef>
                 <a:spcPts val="0"/>
               </a:spcBef>
               <a:buSzPct val="100000"/>
-              <a:defRPr sz="23700"/>
+              <a:defRPr sz="20313"/>
             </a:lvl9pPr>
           </a:lstStyle>
           <a:p>
@@ -4111,8 +4066,8 @@
         </p:nvSpPr>
         <p:spPr>
           <a:xfrm>
-            <a:off x="1115100" y="23628809"/>
-            <a:ext cx="16989900" cy="10831500"/>
+            <a:off x="955800" y="23628809"/>
+            <a:ext cx="14562771" cy="10831500"/>
           </a:xfrm>
           <a:prstGeom prst="rect">
             <a:avLst/>
@@ -4133,7 +4088,7 @@
               </a:spcAft>
               <a:buSzPct val="100000"/>
               <a:buNone/>
-              <a:defRPr sz="11900"/>
+              <a:defRPr sz="10199"/>
             </a:lvl1pPr>
             <a:lvl2pPr algn="ctr">
               <a:lnSpc>
@@ -4147,7 +4102,7 @@
               </a:spcAft>
               <a:buSzPct val="100000"/>
               <a:buNone/>
-              <a:defRPr sz="11900"/>
+              <a:defRPr sz="10199"/>
             </a:lvl2pPr>
             <a:lvl3pPr algn="ctr">
               <a:lnSpc>
@@ -4161,7 +4116,7 @@
               </a:spcAft>
               <a:buSzPct val="100000"/>
               <a:buNone/>
-              <a:defRPr sz="11900"/>
+              <a:defRPr sz="10199"/>
             </a:lvl3pPr>
             <a:lvl4pPr algn="ctr">
               <a:lnSpc>
@@ -4175,7 +4130,7 @@
               </a:spcAft>
               <a:buSzPct val="100000"/>
               <a:buNone/>
-              <a:defRPr sz="11900"/>
+              <a:defRPr sz="10199"/>
             </a:lvl4pPr>
             <a:lvl5pPr algn="ctr">
               <a:lnSpc>
@@ -4189,7 +4144,7 @@
               </a:spcAft>
               <a:buSzPct val="100000"/>
               <a:buNone/>
-              <a:defRPr sz="11900"/>
+              <a:defRPr sz="10199"/>
             </a:lvl5pPr>
             <a:lvl6pPr algn="ctr">
               <a:lnSpc>
@@ -4203,7 +4158,7 @@
               </a:spcAft>
               <a:buSzPct val="100000"/>
               <a:buNone/>
-              <a:defRPr sz="11900"/>
+              <a:defRPr sz="10199"/>
             </a:lvl6pPr>
             <a:lvl7pPr algn="ctr">
               <a:lnSpc>
@@ -4217,7 +4172,7 @@
               </a:spcAft>
               <a:buSzPct val="100000"/>
               <a:buNone/>
-              <a:defRPr sz="11900"/>
+              <a:defRPr sz="10199"/>
             </a:lvl7pPr>
             <a:lvl8pPr algn="ctr">
               <a:lnSpc>
@@ -4231,7 +4186,7 @@
               </a:spcAft>
               <a:buSzPct val="100000"/>
               <a:buNone/>
-              <a:defRPr sz="11900"/>
+              <a:defRPr sz="10199"/>
             </a:lvl8pPr>
             <a:lvl9pPr algn="ctr">
               <a:lnSpc>
@@ -4245,7 +4200,7 @@
               </a:spcAft>
               <a:buSzPct val="100000"/>
               <a:buNone/>
-              <a:defRPr sz="11900"/>
+              <a:defRPr sz="10199"/>
             </a:lvl9pPr>
           </a:lstStyle>
           <a:p>
@@ -4265,8 +4220,8 @@
         </p:nvSpPr>
         <p:spPr>
           <a:xfrm>
-            <a:off x="20745900" y="6179839"/>
-            <a:ext cx="16115399" cy="31531499"/>
+            <a:off x="17782201" y="6179840"/>
+            <a:ext cx="13813199" cy="31531499"/>
           </a:xfrm>
           <a:prstGeom prst="rect">
             <a:avLst/>
@@ -4410,8 +4365,8 @@
         </p:nvSpPr>
         <p:spPr>
           <a:xfrm>
-            <a:off x="35533812" y="39690156"/>
-            <a:ext cx="2304599" cy="3358800"/>
+            <a:off x="30457553" y="39690156"/>
+            <a:ext cx="1975371" cy="3358800"/>
           </a:xfrm>
           <a:prstGeom prst="rect">
             <a:avLst/>
@@ -4423,14 +4378,9 @@
           </a:bodyPr>
           <a:lstStyle/>
           <a:p>
-            <a:pPr>
-              <a:spcBef>
-                <a:spcPts val="0"/>
-              </a:spcBef>
-              <a:buNone/>
-            </a:pPr>
             <a:fld id="{00000000-1234-1234-1234-123412341234}" type="slidenum">
-              <a:rPr lang="en"/>
+              <a:rPr lang="en" smtClean="0"/>
+              <a:pPr/>
               <a:t>‹#›</a:t>
             </a:fld>
             <a:endParaRPr lang="en"/>
@@ -4474,8 +4424,8 @@
         </p:nvSpPr>
         <p:spPr>
           <a:xfrm>
-            <a:off x="1341900" y="36100906"/>
-            <a:ext cx="25194900" cy="5109899"/>
+            <a:off x="1150200" y="36100907"/>
+            <a:ext cx="21595629" cy="5109899"/>
           </a:xfrm>
           <a:prstGeom prst="rect">
             <a:avLst/>
@@ -4515,8 +4465,8 @@
         </p:nvSpPr>
         <p:spPr>
           <a:xfrm>
-            <a:off x="35533812" y="39690156"/>
-            <a:ext cx="2304599" cy="3358800"/>
+            <a:off x="30457553" y="39690156"/>
+            <a:ext cx="1975371" cy="3358800"/>
           </a:xfrm>
           <a:prstGeom prst="rect">
             <a:avLst/>
@@ -4528,18 +4478,13 @@
           </a:bodyPr>
           <a:lstStyle/>
           <a:p>
-            <a:pPr>
-              <a:spcBef>
-                <a:spcPts val="0"/>
-              </a:spcBef>
-              <a:buNone/>
-            </a:pPr>
             <a:fld id="{00000000-1234-1234-1234-123412341234}" type="slidenum">
-              <a:rPr lang="en">
+              <a:rPr lang="en" smtClean="0">
                 <a:solidFill>
                   <a:schemeClr val="dk2"/>
                 </a:solidFill>
               </a:rPr>
+              <a:pPr/>
               <a:t>‹#›</a:t>
             </a:fld>
             <a:endParaRPr lang="en">
@@ -4595,8 +4540,8 @@
         </p:nvSpPr>
         <p:spPr>
           <a:xfrm>
-            <a:off x="1309140" y="3498666"/>
-            <a:ext cx="35786398" cy="5186699"/>
+            <a:off x="1122120" y="3498667"/>
+            <a:ext cx="30674055" cy="5186699"/>
           </a:xfrm>
           <a:prstGeom prst="rect">
             <a:avLst/>
@@ -4807,8 +4752,8 @@
         </p:nvSpPr>
         <p:spPr>
           <a:xfrm>
-            <a:off x="1309140" y="10494933"/>
-            <a:ext cx="35786398" cy="28492798"/>
+            <a:off x="1122120" y="10494933"/>
+            <a:ext cx="30674055" cy="28492798"/>
           </a:xfrm>
           <a:prstGeom prst="rect">
             <a:avLst/>
@@ -5064,8 +5009,8 @@
         </p:nvSpPr>
         <p:spPr>
           <a:xfrm>
-            <a:off x="35533812" y="39690156"/>
-            <a:ext cx="2304599" cy="3358800"/>
+            <a:off x="30457553" y="39690156"/>
+            <a:ext cx="1975371" cy="3358800"/>
           </a:xfrm>
           <a:prstGeom prst="rect">
             <a:avLst/>
@@ -5081,14 +5026,9 @@
           </a:bodyPr>
           <a:lstStyle/>
           <a:p>
-            <a:pPr algn="r">
-              <a:spcBef>
-                <a:spcPts val="0"/>
-              </a:spcBef>
-              <a:buNone/>
-            </a:pPr>
+            <a:pPr algn="r"/>
             <a:fld id="{00000000-1234-1234-1234-123412341234}" type="slidenum">
-              <a:rPr lang="en" sz="5600">
+              <a:rPr lang="en" sz="4800" smtClean="0">
                 <a:solidFill>
                   <a:schemeClr val="lt1"/>
                 </a:solidFill>
@@ -5097,9 +5037,10 @@
                 <a:cs typeface="Roboto"/>
                 <a:sym typeface="Roboto"/>
               </a:rPr>
+              <a:pPr algn="r"/>
               <a:t>‹#›</a:t>
             </a:fld>
-            <a:endParaRPr lang="en" sz="5600">
+            <a:endParaRPr lang="en" sz="4800">
               <a:solidFill>
                 <a:schemeClr val="lt1"/>
               </a:solidFill>
@@ -5152,7 +5093,7 @@
           <a:spcPts val="0"/>
         </a:spcAft>
         <a:buNone/>
-        <a:defRPr sz="1400" b="0" i="0" u="none" strike="noStrike" cap="none" baseline="0">
+        <a:defRPr sz="1200" b="0" i="0" u="none" strike="noStrike" cap="none" baseline="0">
           <a:solidFill>
             <a:srgbClr val="000000"/>
           </a:solidFill>
@@ -5187,7 +5128,7 @@
           <a:spcPts val="0"/>
         </a:spcAft>
         <a:buNone/>
-        <a:defRPr sz="1400" b="0" i="0" u="none" strike="noStrike" cap="none" baseline="0">
+        <a:defRPr sz="1200" b="0" i="0" u="none" strike="noStrike" cap="none" baseline="0">
           <a:solidFill>
             <a:srgbClr val="000000"/>
           </a:solidFill>
@@ -5209,7 +5150,7 @@
           <a:spcPts val="0"/>
         </a:spcAft>
         <a:buNone/>
-        <a:defRPr sz="1400" b="0" i="0" u="none" strike="noStrike" cap="none" baseline="0">
+        <a:defRPr sz="1200" b="0" i="0" u="none" strike="noStrike" cap="none" baseline="0">
           <a:solidFill>
             <a:srgbClr val="000000"/>
           </a:solidFill>
@@ -5231,7 +5172,7 @@
           <a:spcPts val="0"/>
         </a:spcAft>
         <a:buNone/>
-        <a:defRPr sz="1400" b="0" i="0" u="none" strike="noStrike" cap="none" baseline="0">
+        <a:defRPr sz="1200" b="0" i="0" u="none" strike="noStrike" cap="none" baseline="0">
           <a:solidFill>
             <a:srgbClr val="000000"/>
           </a:solidFill>
@@ -5253,7 +5194,7 @@
           <a:spcPts val="0"/>
         </a:spcAft>
         <a:buNone/>
-        <a:defRPr sz="1400" b="0" i="0" u="none" strike="noStrike" cap="none" baseline="0">
+        <a:defRPr sz="1200" b="0" i="0" u="none" strike="noStrike" cap="none" baseline="0">
           <a:solidFill>
             <a:srgbClr val="000000"/>
           </a:solidFill>
@@ -5275,7 +5216,7 @@
           <a:spcPts val="0"/>
         </a:spcAft>
         <a:buNone/>
-        <a:defRPr sz="1400" b="0" i="0" u="none" strike="noStrike" cap="none" baseline="0">
+        <a:defRPr sz="1200" b="0" i="0" u="none" strike="noStrike" cap="none" baseline="0">
           <a:solidFill>
             <a:srgbClr val="000000"/>
           </a:solidFill>
@@ -5297,7 +5238,7 @@
           <a:spcPts val="0"/>
         </a:spcAft>
         <a:buNone/>
-        <a:defRPr sz="1400" b="0" i="0" u="none" strike="noStrike" cap="none" baseline="0">
+        <a:defRPr sz="1200" b="0" i="0" u="none" strike="noStrike" cap="none" baseline="0">
           <a:solidFill>
             <a:srgbClr val="000000"/>
           </a:solidFill>
@@ -5319,7 +5260,7 @@
           <a:spcPts val="0"/>
         </a:spcAft>
         <a:buNone/>
-        <a:defRPr sz="1400" b="0" i="0" u="none" strike="noStrike" cap="none" baseline="0">
+        <a:defRPr sz="1200" b="0" i="0" u="none" strike="noStrike" cap="none" baseline="0">
           <a:solidFill>
             <a:srgbClr val="000000"/>
           </a:solidFill>
@@ -5341,7 +5282,7 @@
           <a:spcPts val="0"/>
         </a:spcAft>
         <a:buNone/>
-        <a:defRPr sz="1400" b="0" i="0" u="none" strike="noStrike" cap="none" baseline="0">
+        <a:defRPr sz="1200" b="0" i="0" u="none" strike="noStrike" cap="none" baseline="0">
           <a:solidFill>
             <a:srgbClr val="000000"/>
           </a:solidFill>
@@ -5363,7 +5304,7 @@
           <a:spcPts val="0"/>
         </a:spcAft>
         <a:buNone/>
-        <a:defRPr sz="1400" b="0" i="0" u="none" strike="noStrike" cap="none" baseline="0">
+        <a:defRPr sz="1200" b="0" i="0" u="none" strike="noStrike" cap="none" baseline="0">
           <a:solidFill>
             <a:srgbClr val="000000"/>
           </a:solidFill>
@@ -5398,7 +5339,7 @@
           <a:spcPts val="0"/>
         </a:spcAft>
         <a:buNone/>
-        <a:defRPr sz="1400" b="0" i="0" u="none" strike="noStrike" cap="none" baseline="0">
+        <a:defRPr sz="1200" b="0" i="0" u="none" strike="noStrike" cap="none" baseline="0">
           <a:solidFill>
             <a:srgbClr val="000000"/>
           </a:solidFill>
@@ -5420,7 +5361,7 @@
           <a:spcPts val="0"/>
         </a:spcAft>
         <a:buNone/>
-        <a:defRPr sz="1400" b="0" i="0" u="none" strike="noStrike" cap="none" baseline="0">
+        <a:defRPr sz="1200" b="0" i="0" u="none" strike="noStrike" cap="none" baseline="0">
           <a:solidFill>
             <a:srgbClr val="000000"/>
           </a:solidFill>
@@ -5442,7 +5383,7 @@
           <a:spcPts val="0"/>
         </a:spcAft>
         <a:buNone/>
-        <a:defRPr sz="1400" b="0" i="0" u="none" strike="noStrike" cap="none" baseline="0">
+        <a:defRPr sz="1200" b="0" i="0" u="none" strike="noStrike" cap="none" baseline="0">
           <a:solidFill>
             <a:srgbClr val="000000"/>
           </a:solidFill>
@@ -5464,7 +5405,7 @@
           <a:spcPts val="0"/>
         </a:spcAft>
         <a:buNone/>
-        <a:defRPr sz="1400" b="0" i="0" u="none" strike="noStrike" cap="none" baseline="0">
+        <a:defRPr sz="1200" b="0" i="0" u="none" strike="noStrike" cap="none" baseline="0">
           <a:solidFill>
             <a:srgbClr val="000000"/>
           </a:solidFill>
@@ -5486,7 +5427,7 @@
           <a:spcPts val="0"/>
         </a:spcAft>
         <a:buNone/>
-        <a:defRPr sz="1400" b="0" i="0" u="none" strike="noStrike" cap="none" baseline="0">
+        <a:defRPr sz="1200" b="0" i="0" u="none" strike="noStrike" cap="none" baseline="0">
           <a:solidFill>
             <a:srgbClr val="000000"/>
           </a:solidFill>
@@ -5508,7 +5449,7 @@
           <a:spcPts val="0"/>
         </a:spcAft>
         <a:buNone/>
-        <a:defRPr sz="1400" b="0" i="0" u="none" strike="noStrike" cap="none" baseline="0">
+        <a:defRPr sz="1200" b="0" i="0" u="none" strike="noStrike" cap="none" baseline="0">
           <a:solidFill>
             <a:srgbClr val="000000"/>
           </a:solidFill>
@@ -5530,7 +5471,7 @@
           <a:spcPts val="0"/>
         </a:spcAft>
         <a:buNone/>
-        <a:defRPr sz="1400" b="0" i="0" u="none" strike="noStrike" cap="none" baseline="0">
+        <a:defRPr sz="1200" b="0" i="0" u="none" strike="noStrike" cap="none" baseline="0">
           <a:solidFill>
             <a:srgbClr val="000000"/>
           </a:solidFill>
@@ -5552,7 +5493,7 @@
           <a:spcPts val="0"/>
         </a:spcAft>
         <a:buNone/>
-        <a:defRPr sz="1400" b="0" i="0" u="none" strike="noStrike" cap="none" baseline="0">
+        <a:defRPr sz="1200" b="0" i="0" u="none" strike="noStrike" cap="none" baseline="0">
           <a:solidFill>
             <a:srgbClr val="000000"/>
           </a:solidFill>
@@ -5574,7 +5515,7 @@
           <a:spcPts val="0"/>
         </a:spcAft>
         <a:buNone/>
-        <a:defRPr sz="1400" b="0" i="0" u="none" strike="noStrike" cap="none" baseline="0">
+        <a:defRPr sz="1200" b="0" i="0" u="none" strike="noStrike" cap="none" baseline="0">
           <a:solidFill>
             <a:srgbClr val="000000"/>
           </a:solidFill>
@@ -5623,8 +5564,8 @@
         </p:nvSpPr>
         <p:spPr>
           <a:xfrm>
-            <a:off x="2047875" y="2047875"/>
-            <a:ext cx="35012219" cy="10377207"/>
+            <a:off x="0" y="2"/>
+            <a:ext cx="32918400" cy="8606116"/>
           </a:xfrm>
           <a:prstGeom prst="rect">
             <a:avLst/>
@@ -5635,93 +5576,325 @@
           </a:ln>
         </p:spPr>
         <p:txBody>
-          <a:bodyPr lIns="91425" tIns="91425" rIns="91425" bIns="91425" anchor="t" anchorCtr="0">
+          <a:bodyPr lIns="914400" tIns="914400" rIns="914400" bIns="914400" anchor="t" anchorCtr="0">
             <a:noAutofit/>
           </a:bodyPr>
           <a:lstStyle/>
           <a:p>
-            <a:pPr rtl="0">
-              <a:spcBef>
-                <a:spcPts val="0"/>
-              </a:spcBef>
-              <a:buNone/>
-            </a:pPr>
             <a:r>
-              <a:rPr lang="en" sz="9600" dirty="0"/>
-              <a:t>Synthetic Biology</a:t>
+              <a:rPr lang="en" sz="8228" dirty="0" smtClean="0"/>
+              <a:t>Synthetic </a:t>
+            </a:r>
+            <a:r>
+              <a:rPr lang="en" sz="8228" dirty="0"/>
+              <a:t>Biology</a:t>
             </a:r>
           </a:p>
           <a:p>
-            <a:pPr rtl="0">
-              <a:spcBef>
-                <a:spcPts val="0"/>
-              </a:spcBef>
-              <a:buNone/>
-            </a:pPr>
-            <a:endParaRPr sz="9600" dirty="0"/>
+            <a:endParaRPr sz="8228" dirty="0"/>
           </a:p>
           <a:p>
-            <a:pPr rtl="0">
-              <a:spcBef>
-                <a:spcPts val="0"/>
-              </a:spcBef>
-              <a:buNone/>
-            </a:pPr>
             <a:r>
-              <a:rPr lang="en" sz="7200" dirty="0"/>
-              <a:t>Students:													</a:t>
+              <a:rPr lang="en" sz="6171" dirty="0"/>
+              <a:t>Students:									</a:t>
             </a:r>
             <a:r>
-              <a:rPr lang="en" sz="7200"/>
-              <a:t>	</a:t>
-            </a:r>
-            <a:r>
-              <a:rPr lang="en" sz="7200" smtClean="0"/>
+              <a:rPr lang="en" sz="6171" dirty="0" smtClean="0"/>
               <a:t>Advised </a:t>
             </a:r>
             <a:r>
-              <a:rPr lang="en" sz="7200" dirty="0"/>
+              <a:rPr lang="en" sz="6171" dirty="0"/>
               <a:t>by:</a:t>
             </a:r>
           </a:p>
           <a:p>
-            <a:pPr rtl="0">
-              <a:spcBef>
-                <a:spcPts val="0"/>
-              </a:spcBef>
-              <a:buNone/>
-            </a:pPr>
             <a:r>
-              <a:rPr lang="en" sz="7200" dirty="0"/>
-              <a:t>Nicolette Lippert											Dr. Ewert</a:t>
+              <a:rPr lang="en" sz="6171" dirty="0"/>
+              <a:t>Nicolette Lippert						</a:t>
+            </a:r>
+            <a:r>
+              <a:rPr lang="en" sz="6171" dirty="0" smtClean="0"/>
+              <a:t>Dr</a:t>
+            </a:r>
+            <a:r>
+              <a:rPr lang="en" sz="6171" dirty="0"/>
+              <a:t>. </a:t>
+            </a:r>
+            <a:r>
+              <a:rPr lang="en" sz="6171" dirty="0"/>
+              <a:t>Ewert</a:t>
             </a:r>
           </a:p>
           <a:p>
-            <a:pPr rtl="0">
-              <a:spcBef>
-                <a:spcPts val="0"/>
-              </a:spcBef>
-              <a:buNone/>
-            </a:pPr>
             <a:r>
-              <a:rPr lang="en" sz="7200" dirty="0"/>
-              <a:t>Andrew Bossert											Jared Hanson</a:t>
+              <a:rPr lang="en" sz="6171" dirty="0"/>
+              <a:t>Andrew Bossert					</a:t>
+            </a:r>
+            <a:r>
+              <a:rPr lang="en" sz="6171" dirty="0"/>
+              <a:t>	</a:t>
+            </a:r>
+            <a:r>
+              <a:rPr lang="en" sz="6171" dirty="0" smtClean="0"/>
+              <a:t>Jared </a:t>
+            </a:r>
+            <a:r>
+              <a:rPr lang="en" sz="6171" dirty="0"/>
+              <a:t>Hanson</a:t>
             </a:r>
           </a:p>
           <a:p>
-            <a:pPr>
-              <a:spcBef>
-                <a:spcPts val="0"/>
-              </a:spcBef>
-              <a:buNone/>
-            </a:pPr>
             <a:r>
-              <a:rPr lang="en" sz="7200" dirty="0"/>
+              <a:rPr lang="en" sz="6171" dirty="0"/>
               <a:t>Christopher Jordan-Denny</a:t>
             </a:r>
           </a:p>
         </p:txBody>
       </p:sp>
+      <mc:AlternateContent xmlns:mc="http://schemas.openxmlformats.org/markup-compatibility/2006">
+        <mc:Choice xmlns:a14="http://schemas.microsoft.com/office/drawing/2010/main" Requires="a14">
+          <p:sp>
+            <p:nvSpPr>
+              <p:cNvPr id="4" name="TextBox 3"/>
+              <p:cNvSpPr txBox="1"/>
+              <p:nvPr/>
+            </p:nvSpPr>
+            <p:spPr>
+              <a:xfrm>
+                <a:off x="0" y="8606118"/>
+                <a:ext cx="32918400" cy="12048564"/>
+              </a:xfrm>
+              <a:prstGeom prst="rect">
+                <a:avLst/>
+              </a:prstGeom>
+              <a:noFill/>
+            </p:spPr>
+            <p:txBody>
+              <a:bodyPr wrap="square" lIns="914400" tIns="914400" rIns="914400" bIns="914400" numCol="2" spcCol="914400" rtlCol="0">
+                <a:noAutofit/>
+              </a:bodyPr>
+              <a:lstStyle/>
+              <a:p>
+                <a:pPr marL="857250" indent="-857250">
+                  <a:buAutoNum type="romanUcPeriod"/>
+                </a:pPr>
+                <a:r>
+                  <a:rPr lang="en-US" sz="4800" dirty="0" smtClean="0"/>
+                  <a:t>Implications of Membrane Potential</a:t>
+                </a:r>
+              </a:p>
+              <a:p>
+                <a:endParaRPr lang="en-US" sz="4800" dirty="0" smtClean="0"/>
+              </a:p>
+              <a:p>
+                <a:r>
+                  <a:rPr lang="en-US" sz="4800" dirty="0"/>
+                  <a:t>Although there may be many implications of transmembrane potential at radio frequencies, the focus of this example is in disease models. In the late 1930's it was suggested that a relationship lie between cancer and the bioelectric properties of host tissue. Interestingly, membrane voltage </a:t>
+                </a:r>
+                <a14:m>
+                  <m:oMath xmlns:m="http://schemas.openxmlformats.org/officeDocument/2006/math">
+                    <m:sSub>
+                      <m:sSubPr>
+                        <m:ctrlPr>
+                          <a:rPr lang="en-US" sz="4800" i="1" dirty="0" smtClean="0">
+                            <a:latin typeface="Cambria Math" panose="02040503050406030204" pitchFamily="18" charset="0"/>
+                          </a:rPr>
+                        </m:ctrlPr>
+                      </m:sSubPr>
+                      <m:e>
+                        <m:r>
+                          <a:rPr lang="en-US" sz="4800" b="0" i="1" dirty="0" smtClean="0">
+                            <a:latin typeface="Cambria Math" panose="02040503050406030204" pitchFamily="18" charset="0"/>
+                          </a:rPr>
+                          <m:t>𝑉</m:t>
+                        </m:r>
+                      </m:e>
+                      <m:sub>
+                        <m:r>
+                          <a:rPr lang="en-US" sz="4800" i="1" dirty="0">
+                            <a:latin typeface="Cambria Math" panose="02040503050406030204" pitchFamily="18" charset="0"/>
+                          </a:rPr>
+                          <m:t>𝑚𝑒𝑚</m:t>
+                        </m:r>
+                      </m:sub>
+                    </m:sSub>
+                  </m:oMath>
+                </a14:m>
+                <a:r>
+                  <a:rPr lang="en-US" sz="4800" dirty="0" smtClean="0"/>
+                  <a:t> analysis </a:t>
+                </a:r>
+                <a:r>
+                  <a:rPr lang="en-US" sz="4800" dirty="0"/>
+                  <a:t>in many different mammalian cell types reveals that proliferative (to grow by rapid production of new parts) potential is correlated with unique ranges of </a:t>
+                </a:r>
+                <a14:m>
+                  <m:oMath xmlns:m="http://schemas.openxmlformats.org/officeDocument/2006/math">
+                    <m:sSub>
+                      <m:sSubPr>
+                        <m:ctrlPr>
+                          <a:rPr lang="en-US" sz="4800" i="1" dirty="0">
+                            <a:latin typeface="Cambria Math" panose="02040503050406030204" pitchFamily="18" charset="0"/>
+                          </a:rPr>
+                        </m:ctrlPr>
+                      </m:sSubPr>
+                      <m:e>
+                        <m:r>
+                          <a:rPr lang="en-US" sz="4800" i="1" dirty="0">
+                            <a:latin typeface="Cambria Math" panose="02040503050406030204" pitchFamily="18" charset="0"/>
+                          </a:rPr>
+                          <m:t>𝑉</m:t>
+                        </m:r>
+                      </m:e>
+                      <m:sub>
+                        <m:r>
+                          <a:rPr lang="en-US" sz="4800" i="1" dirty="0">
+                            <a:latin typeface="Cambria Math" panose="02040503050406030204" pitchFamily="18" charset="0"/>
+                          </a:rPr>
+                          <m:t>𝑚𝑒𝑚</m:t>
+                        </m:r>
+                      </m:sub>
+                    </m:sSub>
+                  </m:oMath>
+                </a14:m>
+                <a:r>
+                  <a:rPr lang="en-US" sz="4800" dirty="0"/>
+                  <a:t>: quiescent cells (cells withdrawn from the cell cycle and do not proliferate) tend to be hyperpolarized (more negative), whereas highly plastic cells such as embryonic cells</a:t>
+                </a:r>
+                <a:r>
+                  <a:rPr lang="en-US" sz="4800" dirty="0" smtClean="0"/>
+                  <a:t>, adult </a:t>
+                </a:r>
+                <a:r>
+                  <a:rPr lang="en-US" sz="4800" dirty="0"/>
+                  <a:t>stem cells and tumors cells are depolarized (more positive). </a:t>
+                </a:r>
+                <a:r>
+                  <a:rPr lang="en-US" sz="4800" dirty="0" smtClean="0"/>
+                  <a:t>During </a:t>
+                </a:r>
+                <a:r>
+                  <a:rPr lang="en-US" sz="4800" dirty="0"/>
+                  <a:t>the early stages of tumor formation, </a:t>
+                </a:r>
+                <a14:m>
+                  <m:oMath xmlns:m="http://schemas.openxmlformats.org/officeDocument/2006/math">
+                    <m:sSub>
+                      <m:sSubPr>
+                        <m:ctrlPr>
+                          <a:rPr lang="en-US" sz="4800" i="1" dirty="0">
+                            <a:latin typeface="Cambria Math" panose="02040503050406030204" pitchFamily="18" charset="0"/>
+                          </a:rPr>
+                        </m:ctrlPr>
+                      </m:sSubPr>
+                      <m:e>
+                        <m:r>
+                          <a:rPr lang="en-US" sz="4800" i="1" dirty="0">
+                            <a:latin typeface="Cambria Math" panose="02040503050406030204" pitchFamily="18" charset="0"/>
+                          </a:rPr>
+                          <m:t>𝑉</m:t>
+                        </m:r>
+                      </m:e>
+                      <m:sub>
+                        <m:r>
+                          <a:rPr lang="en-US" sz="4800" i="1" dirty="0">
+                            <a:latin typeface="Cambria Math" panose="02040503050406030204" pitchFamily="18" charset="0"/>
+                          </a:rPr>
+                          <m:t>𝑚𝑒𝑚</m:t>
+                        </m:r>
+                      </m:sub>
+                    </m:sSub>
+                  </m:oMath>
+                </a14:m>
+                <a:r>
+                  <a:rPr lang="en-US" sz="4800" dirty="0" smtClean="0"/>
+                  <a:t> is </a:t>
+                </a:r>
+                <a:r>
+                  <a:rPr lang="en-US" sz="4800" dirty="0"/>
+                  <a:t>a key regulator of the cell cycle and determines the proliferative state of many different kinds of cells. These statements excite the possibility of non-invasive techniques being used to track bioelectric cell states and detection of tumors, or even mitigation of tumor formation by canonical oncogene (gene that has potential to cause cancer</a:t>
+                </a:r>
+                <a:r>
+                  <a:rPr lang="en-US" sz="4800" dirty="0" smtClean="0"/>
+                  <a:t>).</a:t>
+                </a:r>
+              </a:p>
+              <a:p>
+                <a:endParaRPr lang="en-US" sz="4800" dirty="0" smtClean="0"/>
+              </a:p>
+              <a:p>
+                <a:pPr marL="1028700" indent="-1028700">
+                  <a:buFont typeface="+mj-lt"/>
+                  <a:buAutoNum type="romanUcPeriod" startAt="2"/>
+                </a:pPr>
+                <a:r>
+                  <a:rPr lang="en-US" sz="4800" dirty="0" smtClean="0"/>
+                  <a:t>Hypothesis</a:t>
+                </a:r>
+              </a:p>
+              <a:p>
+                <a:endParaRPr lang="en-US" sz="4800" dirty="0"/>
+              </a:p>
+              <a:p>
+                <a:r>
+                  <a:rPr lang="en-US" sz="4800" dirty="0"/>
+                  <a:t>When using dielectric spectroscopy, the mouse </a:t>
+                </a:r>
+                <a:r>
+                  <a:rPr lang="en-US" sz="4800" dirty="0" err="1"/>
+                  <a:t>hybridoma</a:t>
+                </a:r>
+                <a:r>
+                  <a:rPr lang="en-US" sz="4800" dirty="0"/>
+                  <a:t> cells when exposed to a range of radio frequencies will have a constant relative dielectric </a:t>
+                </a:r>
+                <a:r>
+                  <a:rPr lang="en-US" sz="4800" dirty="0" smtClean="0"/>
+                  <a:t>permittivity. </a:t>
+                </a:r>
+              </a:p>
+            </p:txBody>
+          </p:sp>
+        </mc:Choice>
+        <mc:Fallback>
+          <p:sp>
+            <p:nvSpPr>
+              <p:cNvPr id="4" name="TextBox 3"/>
+              <p:cNvSpPr txBox="1">
+                <a:spLocks noRot="1" noChangeAspect="1" noMove="1" noResize="1" noEditPoints="1" noAdjustHandles="1" noChangeArrowheads="1" noChangeShapeType="1" noTextEdit="1"/>
+              </p:cNvSpPr>
+              <p:nvPr/>
+            </p:nvSpPr>
+            <p:spPr>
+              <a:xfrm>
+                <a:off x="0" y="8606118"/>
+                <a:ext cx="32918400" cy="12048564"/>
+              </a:xfrm>
+              <a:prstGeom prst="rect">
+                <a:avLst/>
+              </a:prstGeom>
+              <a:blipFill>
+                <a:blip r:embed="rId3"/>
+                <a:stretch>
+                  <a:fillRect b="-1670"/>
+                </a:stretch>
+              </a:blipFill>
+            </p:spPr>
+            <p:txBody>
+              <a:bodyPr/>
+              <a:lstStyle/>
+              <a:p>
+                <a:r>
+                  <a:rPr lang="en-US">
+                    <a:noFill/>
+                  </a:rPr>
+                  <a:t> </a:t>
+                </a:r>
+              </a:p>
+            </p:txBody>
+          </p:sp>
+        </mc:Fallback>
+      </mc:AlternateContent>
     </p:spTree>
   </p:cSld>
   <p:clrMapOvr>

</xml_diff>